<commit_message>
Update Climate Data Introduction.pptx
</commit_message>
<xml_diff>
--- a/Climate Data Introduction.pptx
+++ b/Climate Data Introduction.pptx
@@ -5049,6 +5049,18 @@
               <a:rPr lang="en-US" dirty="0"/>
               <a:t>Enable all extensions (python extension)</a:t>
             </a:r>
+            <a:br>
+              <a:rPr lang="en-US" dirty="0"/>
+            </a:br>
+            <a:r>
+              <a:rPr lang="en-US" altLang="zh-CN" dirty="0" err="1"/>
+              <a:t>ctrl+shift+x</a:t>
+            </a:r>
+            <a:r>
+              <a:rPr lang="en-US" altLang="zh-CN" dirty="0"/>
+              <a:t> or go to View &gt; Extensions</a:t>
+            </a:r>
+            <a:endParaRPr lang="en-US" dirty="0"/>
           </a:p>
         </p:txBody>
       </p:sp>
@@ -5406,6 +5418,13 @@
               <a:rPr lang="en-US" altLang="zh-CN" dirty="0"/>
               <a:t>link)</a:t>
             </a:r>
+            <a:br>
+              <a:rPr lang="en-US" altLang="zh-CN" dirty="0"/>
+            </a:br>
+            <a:r>
+              <a:rPr lang="en-US" altLang="zh-CN" sz="3200" dirty="0"/>
+              <a:t>be aware, poorly documented</a:t>
+            </a:r>
             <a:endParaRPr lang="en-US" dirty="0"/>
           </a:p>
         </p:txBody>
@@ -5693,7 +5712,7 @@
             <a:pPr lvl="1"/>
             <a:r>
               <a:rPr lang="en-US" dirty="0"/>
-              <a:t>Currently full, but recording will be posted on </a:t>
+              <a:t>Currently no space for new register, but recording will be posted on </a:t>
             </a:r>
             <a:r>
               <a:rPr lang="en-US" dirty="0">

</xml_diff>